<commit_message>
hw fixes, lecture extra slides
</commit_message>
<xml_diff>
--- a/Lectures/Lecture12.pptx
+++ b/Lectures/Lecture12.pptx
@@ -5,7 +5,7 @@
     <p:sldMasterId id="2147483648" r:id="rId1"/>
   </p:sldMasterIdLst>
   <p:notesMasterIdLst>
-    <p:notesMasterId r:id="rId42"/>
+    <p:notesMasterId r:id="rId43"/>
   </p:notesMasterIdLst>
   <p:sldIdLst>
     <p:sldId id="296" r:id="rId2"/>
@@ -46,8 +46,9 @@
     <p:sldId id="577" r:id="rId37"/>
     <p:sldId id="578" r:id="rId38"/>
     <p:sldId id="580" r:id="rId39"/>
-    <p:sldId id="583" r:id="rId40"/>
-    <p:sldId id="581" r:id="rId41"/>
+    <p:sldId id="589" r:id="rId40"/>
+    <p:sldId id="583" r:id="rId41"/>
+    <p:sldId id="581" r:id="rId42"/>
   </p:sldIdLst>
   <p:sldSz cx="12192000" cy="6858000"/>
   <p:notesSz cx="6858000" cy="9144000"/>
@@ -213,6 +214,7 @@
             <p14:sldId id="577"/>
             <p14:sldId id="578"/>
             <p14:sldId id="580"/>
+            <p14:sldId id="589"/>
             <p14:sldId id="583"/>
             <p14:sldId id="581"/>
           </p14:sldIdLst>
@@ -311,7 +313,7 @@
           <a:p>
             <a:fld id="{CBA08D16-15DC-4E25-BDC3-F25146157B16}" type="datetimeFigureOut">
               <a:rPr lang="ru-RU" smtClean="0"/>
-              <a:t>17.12.2020</a:t>
+              <a:t>09.12.2021</a:t>
             </a:fld>
             <a:endParaRPr lang="ru-RU"/>
           </a:p>
@@ -896,7 +898,7 @@
           <a:p>
             <a:fld id="{FCEC8293-DB51-454A-BE81-EC8FCB31EBA2}" type="datetime1">
               <a:rPr lang="ru-RU" smtClean="0"/>
-              <a:t>17.12.2020</a:t>
+              <a:t>09.12.2021</a:t>
             </a:fld>
             <a:endParaRPr lang="ru-RU"/>
           </a:p>
@@ -1070,7 +1072,7 @@
           <a:p>
             <a:fld id="{241C87B1-1C35-4DBD-BC18-2BC72E776603}" type="datetime1">
               <a:rPr lang="ru-RU" smtClean="0"/>
-              <a:t>17.12.2020</a:t>
+              <a:t>09.12.2021</a:t>
             </a:fld>
             <a:endParaRPr lang="ru-RU"/>
           </a:p>
@@ -1254,7 +1256,7 @@
           <a:p>
             <a:fld id="{3134C275-26C0-42CD-9111-9ADE65922AF9}" type="datetime1">
               <a:rPr lang="ru-RU" smtClean="0"/>
-              <a:t>17.12.2020</a:t>
+              <a:t>09.12.2021</a:t>
             </a:fld>
             <a:endParaRPr lang="ru-RU"/>
           </a:p>
@@ -1428,7 +1430,7 @@
           <a:p>
             <a:fld id="{C1A9A50B-C350-45F5-8AAB-ADB9E670AF2E}" type="datetime1">
               <a:rPr lang="ru-RU" smtClean="0"/>
-              <a:t>17.12.2020</a:t>
+              <a:t>09.12.2021</a:t>
             </a:fld>
             <a:endParaRPr lang="ru-RU"/>
           </a:p>
@@ -1678,7 +1680,7 @@
           <a:p>
             <a:fld id="{089688C9-348F-42F9-B6C0-5990DDE0C5B2}" type="datetime1">
               <a:rPr lang="ru-RU" smtClean="0"/>
-              <a:t>17.12.2020</a:t>
+              <a:t>09.12.2021</a:t>
             </a:fld>
             <a:endParaRPr lang="ru-RU"/>
           </a:p>
@@ -1914,7 +1916,7 @@
           <a:p>
             <a:fld id="{684AFD8F-6DD9-4AD3-A505-FDC3F5C5F3F6}" type="datetime1">
               <a:rPr lang="ru-RU" smtClean="0"/>
-              <a:t>17.12.2020</a:t>
+              <a:t>09.12.2021</a:t>
             </a:fld>
             <a:endParaRPr lang="ru-RU"/>
           </a:p>
@@ -2285,7 +2287,7 @@
           <a:p>
             <a:fld id="{63551EFE-4D02-45EB-A747-8B6F047B5AA0}" type="datetime1">
               <a:rPr lang="ru-RU" smtClean="0"/>
-              <a:t>17.12.2020</a:t>
+              <a:t>09.12.2021</a:t>
             </a:fld>
             <a:endParaRPr lang="ru-RU"/>
           </a:p>
@@ -2407,7 +2409,7 @@
           <a:p>
             <a:fld id="{813A9F34-E5CD-4B8F-AA9E-889C84372B20}" type="datetime1">
               <a:rPr lang="ru-RU" smtClean="0"/>
-              <a:t>17.12.2020</a:t>
+              <a:t>09.12.2021</a:t>
             </a:fld>
             <a:endParaRPr lang="ru-RU"/>
           </a:p>
@@ -2506,7 +2508,7 @@
           <a:p>
             <a:fld id="{51224D22-9B29-44A6-8E82-95FC492DEDC1}" type="datetime1">
               <a:rPr lang="ru-RU" smtClean="0"/>
-              <a:t>17.12.2020</a:t>
+              <a:t>09.12.2021</a:t>
             </a:fld>
             <a:endParaRPr lang="ru-RU"/>
           </a:p>
@@ -2787,7 +2789,7 @@
           <a:p>
             <a:fld id="{91D1034F-4441-48A1-BDC0-25EA1022324A}" type="datetime1">
               <a:rPr lang="ru-RU" smtClean="0"/>
-              <a:t>17.12.2020</a:t>
+              <a:t>09.12.2021</a:t>
             </a:fld>
             <a:endParaRPr lang="ru-RU"/>
           </a:p>
@@ -3044,7 +3046,7 @@
           <a:p>
             <a:fld id="{B0FFDE79-B627-473B-AE17-4C65BD2495F7}" type="datetime1">
               <a:rPr lang="ru-RU" smtClean="0"/>
-              <a:t>17.12.2020</a:t>
+              <a:t>09.12.2021</a:t>
             </a:fld>
             <a:endParaRPr lang="ru-RU"/>
           </a:p>
@@ -3261,7 +3263,7 @@
           <a:p>
             <a:fld id="{11CA537A-1B8C-47BA-9BA6-7CE3FAFDA8BE}" type="datetime1">
               <a:rPr lang="ru-RU" smtClean="0"/>
-              <a:t>17.12.2020</a:t>
+              <a:t>09.12.2021</a:t>
             </a:fld>
             <a:endParaRPr lang="ru-RU"/>
           </a:p>
@@ -9337,8 +9339,8 @@
           </a:p>
         </p:txBody>
       </p:sp>
-      <mc:AlternateContent xmlns:mc="http://schemas.openxmlformats.org/markup-compatibility/2006">
-        <mc:Choice xmlns:a14="http://schemas.microsoft.com/office/drawing/2010/main" Requires="a14">
+      <mc:AlternateContent xmlns:mc="http://schemas.openxmlformats.org/markup-compatibility/2006" xmlns:a14="http://schemas.microsoft.com/office/drawing/2010/main">
+        <mc:Choice Requires="a14">
           <p:sp>
             <p:nvSpPr>
               <p:cNvPr id="3" name="Объект 2"/>
@@ -9381,15 +9383,7 @@
                 </a:r>
                 <a:r>
                   <a:rPr lang="ru-RU" dirty="0" smtClean="0"/>
-                  <a:t>шифров данная атака невозможна, т.к. </a:t>
-                </a:r>
-                <a:r>
-                  <a:rPr lang="ru-RU" dirty="0" smtClean="0"/>
-                  <a:t>шифр </a:t>
-                </a:r>
-                <a:r>
-                  <a:rPr lang="ru-RU" dirty="0" smtClean="0"/>
-                  <a:t>гарантирует невозможность получения корректного </a:t>
+                  <a:t>шифров данная атака невозможна, т.к. шифр гарантирует невозможность получения корректного </a:t>
                 </a:r>
                 <a:r>
                   <a:rPr lang="ru-RU" dirty="0" err="1" smtClean="0"/>
@@ -9424,7 +9418,7 @@
             </p:txBody>
           </p:sp>
         </mc:Choice>
-        <mc:Fallback>
+        <mc:Fallback xmlns="">
           <p:sp>
             <p:nvSpPr>
               <p:cNvPr id="3" name="Объект 2"/>
@@ -16034,8 +16028,8 @@
           </a:p>
         </p:txBody>
       </p:sp>
-      <mc:AlternateContent xmlns:mc="http://schemas.openxmlformats.org/markup-compatibility/2006">
-        <mc:Choice xmlns:a14="http://schemas.microsoft.com/office/drawing/2010/main" Requires="a14">
+      <mc:AlternateContent xmlns:mc="http://schemas.openxmlformats.org/markup-compatibility/2006" xmlns:a14="http://schemas.microsoft.com/office/drawing/2010/main">
+        <mc:Choice Requires="a14">
           <p:sp>
             <p:nvSpPr>
               <p:cNvPr id="3" name="Объект 2"/>
@@ -16248,15 +16242,7 @@
                 </a:r>
                 <a:r>
                   <a:rPr lang="en-US" dirty="0" smtClean="0"/>
-                  <a:t>&gt; </a:t>
-                </a:r>
-                <a:r>
-                  <a:rPr lang="en-US" dirty="0" smtClean="0"/>
-                  <a:t>CPA </a:t>
-                </a:r>
-                <a:r>
-                  <a:rPr lang="en-US" dirty="0" smtClean="0"/>
-                  <a:t>+</a:t>
+                  <a:t>&gt; CPA +</a:t>
                 </a:r>
                 <a:r>
                   <a:rPr lang="ru-RU" dirty="0" smtClean="0"/>
@@ -16280,11 +16266,7 @@
                 </a:r>
                 <a:r>
                   <a:rPr lang="en-US" dirty="0" smtClean="0"/>
-                  <a:t>) </a:t>
-                </a:r>
-                <a:r>
-                  <a:rPr lang="en-US" dirty="0" smtClean="0"/>
-                  <a:t>=&gt;</a:t>
+                  <a:t>) =&gt;</a:t>
                 </a:r>
                 <a:r>
                   <a:rPr lang="ru-RU" dirty="0" smtClean="0"/>
@@ -16333,11 +16315,7 @@
                 </a:r>
                 <a:r>
                   <a:rPr lang="en-US" dirty="0" smtClean="0"/>
-                  <a:t>) </a:t>
-                </a:r>
-                <a:r>
-                  <a:rPr lang="en-US" dirty="0" smtClean="0"/>
-                  <a:t>=&gt; AE </a:t>
+                  <a:t>) =&gt; AE </a:t>
                 </a:r>
                 <a:r>
                   <a:rPr lang="ru-RU" dirty="0" smtClean="0"/>
@@ -16385,7 +16363,7 @@
             </p:txBody>
           </p:sp>
         </mc:Choice>
-        <mc:Fallback>
+        <mc:Fallback xmlns="">
           <p:sp>
             <p:nvSpPr>
               <p:cNvPr id="3" name="Объект 2"/>
@@ -27117,54 +27095,17 @@
         </p:nvSpPr>
         <p:spPr/>
         <p:txBody>
-          <a:bodyPr>
-            <a:normAutofit/>
-          </a:bodyPr>
-          <a:lstStyle/>
-          <a:p>
-            <a:r>
-              <a:rPr lang="ru-RU" dirty="0" smtClean="0"/>
-              <a:t>Построение аутентифицированного шифровани</a:t>
-            </a:r>
-            <a:r>
-              <a:rPr lang="ru-RU" dirty="0"/>
-              <a:t>я</a:t>
-            </a:r>
-            <a:r>
-              <a:rPr lang="ru-RU" dirty="0" smtClean="0"/>
-              <a:t> с помощью </a:t>
-            </a:r>
-            <a:r>
-              <a:rPr lang="en-US" dirty="0" smtClean="0"/>
-              <a:t>SHA-3 </a:t>
-            </a:r>
-            <a:r>
-              <a:rPr lang="ru-RU" dirty="0" smtClean="0"/>
-              <a:t>(</a:t>
-            </a:r>
-            <a:r>
-              <a:rPr lang="en-US" dirty="0" smtClean="0"/>
-              <a:t>Strobe)</a:t>
-            </a:r>
-            <a:endParaRPr lang="ru-RU" dirty="0"/>
-          </a:p>
-        </p:txBody>
-      </p:sp>
-      <p:sp>
-        <p:nvSpPr>
-          <p:cNvPr id="3" name="Объект 2"/>
-          <p:cNvSpPr>
-            <a:spLocks noGrp="1"/>
-          </p:cNvSpPr>
-          <p:nvPr>
-            <p:ph idx="1"/>
-          </p:nvPr>
-        </p:nvSpPr>
-        <p:spPr/>
-        <p:txBody>
           <a:bodyPr/>
           <a:lstStyle/>
           <a:p>
+            <a:r>
+              <a:rPr lang="en-US" dirty="0" err="1"/>
+              <a:t>ChaCha</a:t>
+            </a:r>
+            <a:r>
+              <a:rPr lang="en-US" dirty="0"/>
+              <a:t>/Poly1305</a:t>
+            </a:r>
             <a:endParaRPr lang="ru-RU" dirty="0"/>
           </a:p>
         </p:txBody>
@@ -27208,8 +27149,8 @@
         </p:blipFill>
         <p:spPr>
           <a:xfrm>
-            <a:off x="1363002" y="2376059"/>
-            <a:ext cx="9241663" cy="3800904"/>
+            <a:off x="3216519" y="1853536"/>
+            <a:ext cx="5895242" cy="4339965"/>
           </a:xfrm>
           <a:prstGeom prst="rect">
             <a:avLst/>
@@ -27219,20 +27160,13 @@
     </p:spTree>
     <p:extLst>
       <p:ext uri="{BB962C8B-B14F-4D97-AF65-F5344CB8AC3E}">
-        <p14:creationId xmlns:p14="http://schemas.microsoft.com/office/powerpoint/2010/main" val="3576253066"/>
+        <p14:creationId xmlns:p14="http://schemas.microsoft.com/office/powerpoint/2010/main" val="4121067434"/>
       </p:ext>
     </p:extLst>
   </p:cSld>
   <p:clrMapOvr>
     <a:masterClrMapping/>
   </p:clrMapOvr>
-  <p:timing>
-    <p:tnLst>
-      <p:par>
-        <p:cTn id="1" dur="indefinite" restart="never" nodeType="tmRoot"/>
-      </p:par>
-    </p:tnLst>
-  </p:timing>
 </p:sld>
 </file>
 
@@ -27996,12 +27930,34 @@
         </p:nvSpPr>
         <p:spPr/>
         <p:txBody>
-          <a:bodyPr/>
+          <a:bodyPr>
+            <a:normAutofit/>
+          </a:bodyPr>
           <a:lstStyle/>
           <a:p>
             <a:r>
               <a:rPr lang="ru-RU" dirty="0" smtClean="0"/>
-              <a:t>Выводы</a:t>
+              <a:t>Построение аутентифицированного шифровани</a:t>
+            </a:r>
+            <a:r>
+              <a:rPr lang="ru-RU" dirty="0"/>
+              <a:t>я</a:t>
+            </a:r>
+            <a:r>
+              <a:rPr lang="ru-RU" dirty="0" smtClean="0"/>
+              <a:t> с помощью </a:t>
+            </a:r>
+            <a:r>
+              <a:rPr lang="en-US" dirty="0" smtClean="0"/>
+              <a:t>SHA-3 </a:t>
+            </a:r>
+            <a:r>
+              <a:rPr lang="ru-RU" dirty="0" smtClean="0"/>
+              <a:t>(</a:t>
+            </a:r>
+            <a:r>
+              <a:rPr lang="en-US" dirty="0" smtClean="0"/>
+              <a:t>Strobe)</a:t>
             </a:r>
             <a:endParaRPr lang="ru-RU" dirty="0"/>
           </a:p>
@@ -28022,46 +27978,6 @@
           <a:bodyPr/>
           <a:lstStyle/>
           <a:p>
-            <a:r>
-              <a:rPr lang="ru-RU" dirty="0" smtClean="0"/>
-              <a:t>Для построения защищенных каналов необходимо использовать </a:t>
-            </a:r>
-            <a:r>
-              <a:rPr lang="en-US" dirty="0" smtClean="0"/>
-              <a:t>AE </a:t>
-            </a:r>
-            <a:r>
-              <a:rPr lang="ru-RU" dirty="0" smtClean="0"/>
-              <a:t>шифрование</a:t>
-            </a:r>
-          </a:p>
-          <a:p>
-            <a:r>
-              <a:rPr lang="ru-RU" dirty="0" smtClean="0"/>
-              <a:t>Лучше использовать </a:t>
-            </a:r>
-            <a:r>
-              <a:rPr lang="en-US" dirty="0" smtClean="0"/>
-              <a:t>Encrypt-Then-MAC </a:t>
-            </a:r>
-            <a:r>
-              <a:rPr lang="ru-RU" dirty="0" smtClean="0"/>
-              <a:t>или один из стандартов </a:t>
-            </a:r>
-            <a:r>
-              <a:rPr lang="en-US" dirty="0" smtClean="0"/>
-              <a:t>AEAD </a:t>
-            </a:r>
-            <a:r>
-              <a:rPr lang="ru-RU" dirty="0" smtClean="0"/>
-              <a:t>шифрования</a:t>
-            </a:r>
-          </a:p>
-          <a:p>
-            <a:r>
-              <a:rPr lang="ru-RU" dirty="0" smtClean="0"/>
-              <a:t>Никогда не реализовывать криптографию!</a:t>
-            </a:r>
             <a:endParaRPr lang="ru-RU" dirty="0"/>
           </a:p>
         </p:txBody>
@@ -28084,6 +28000,172 @@
             <a:fld id="{8253DDDB-F8F7-4D64-A7FD-3F3D61C1949F}" type="slidenum">
               <a:rPr lang="ru-RU" smtClean="0"/>
               <a:t>40</a:t>
+            </a:fld>
+            <a:endParaRPr lang="ru-RU"/>
+          </a:p>
+        </p:txBody>
+      </p:sp>
+      <p:pic>
+        <p:nvPicPr>
+          <p:cNvPr id="5" name="Рисунок 4"/>
+          <p:cNvPicPr>
+            <a:picLocks noChangeAspect="1"/>
+          </p:cNvPicPr>
+          <p:nvPr/>
+        </p:nvPicPr>
+        <p:blipFill>
+          <a:blip r:embed="rId2"/>
+          <a:stretch>
+            <a:fillRect/>
+          </a:stretch>
+        </p:blipFill>
+        <p:spPr>
+          <a:xfrm>
+            <a:off x="1363002" y="2376059"/>
+            <a:ext cx="9241663" cy="3800904"/>
+          </a:xfrm>
+          <a:prstGeom prst="rect">
+            <a:avLst/>
+          </a:prstGeom>
+        </p:spPr>
+      </p:pic>
+    </p:spTree>
+    <p:extLst>
+      <p:ext uri="{BB962C8B-B14F-4D97-AF65-F5344CB8AC3E}">
+        <p14:creationId xmlns:p14="http://schemas.microsoft.com/office/powerpoint/2010/main" val="3576253066"/>
+      </p:ext>
+    </p:extLst>
+  </p:cSld>
+  <p:clrMapOvr>
+    <a:masterClrMapping/>
+  </p:clrMapOvr>
+  <p:timing>
+    <p:tnLst>
+      <p:par>
+        <p:cTn id="1" dur="indefinite" restart="never" nodeType="tmRoot"/>
+      </p:par>
+    </p:tnLst>
+  </p:timing>
+</p:sld>
+</file>
+
+<file path=ppt/slides/slide41.xml><?xml version="1.0" encoding="utf-8"?>
+<p:sld xmlns:a="http://schemas.openxmlformats.org/drawingml/2006/main" xmlns:r="http://schemas.openxmlformats.org/officeDocument/2006/relationships" xmlns:p="http://schemas.openxmlformats.org/presentationml/2006/main">
+  <p:cSld>
+    <p:spTree>
+      <p:nvGrpSpPr>
+        <p:cNvPr id="1" name=""/>
+        <p:cNvGrpSpPr/>
+        <p:nvPr/>
+      </p:nvGrpSpPr>
+      <p:grpSpPr>
+        <a:xfrm>
+          <a:off x="0" y="0"/>
+          <a:ext cx="0" cy="0"/>
+          <a:chOff x="0" y="0"/>
+          <a:chExt cx="0" cy="0"/>
+        </a:xfrm>
+      </p:grpSpPr>
+      <p:sp>
+        <p:nvSpPr>
+          <p:cNvPr id="2" name="Заголовок 1"/>
+          <p:cNvSpPr>
+            <a:spLocks noGrp="1"/>
+          </p:cNvSpPr>
+          <p:nvPr>
+            <p:ph type="title"/>
+          </p:nvPr>
+        </p:nvSpPr>
+        <p:spPr/>
+        <p:txBody>
+          <a:bodyPr/>
+          <a:lstStyle/>
+          <a:p>
+            <a:r>
+              <a:rPr lang="ru-RU" dirty="0" smtClean="0"/>
+              <a:t>Выводы</a:t>
+            </a:r>
+            <a:endParaRPr lang="ru-RU" dirty="0"/>
+          </a:p>
+        </p:txBody>
+      </p:sp>
+      <p:sp>
+        <p:nvSpPr>
+          <p:cNvPr id="3" name="Объект 2"/>
+          <p:cNvSpPr>
+            <a:spLocks noGrp="1"/>
+          </p:cNvSpPr>
+          <p:nvPr>
+            <p:ph idx="1"/>
+          </p:nvPr>
+        </p:nvSpPr>
+        <p:spPr/>
+        <p:txBody>
+          <a:bodyPr/>
+          <a:lstStyle/>
+          <a:p>
+            <a:r>
+              <a:rPr lang="ru-RU" dirty="0" smtClean="0"/>
+              <a:t>Для построения защищенных каналов необходимо использовать </a:t>
+            </a:r>
+            <a:r>
+              <a:rPr lang="en-US" dirty="0" smtClean="0"/>
+              <a:t>AE </a:t>
+            </a:r>
+            <a:r>
+              <a:rPr lang="ru-RU" dirty="0" smtClean="0"/>
+              <a:t>шифрование</a:t>
+            </a:r>
+          </a:p>
+          <a:p>
+            <a:r>
+              <a:rPr lang="ru-RU" dirty="0" smtClean="0"/>
+              <a:t>Лучше использовать </a:t>
+            </a:r>
+            <a:r>
+              <a:rPr lang="en-US" dirty="0" smtClean="0"/>
+              <a:t>Encrypt-Then-MAC </a:t>
+            </a:r>
+            <a:r>
+              <a:rPr lang="ru-RU" dirty="0" smtClean="0"/>
+              <a:t>или один из стандартов </a:t>
+            </a:r>
+            <a:r>
+              <a:rPr lang="en-US" dirty="0" smtClean="0"/>
+              <a:t>AEAD </a:t>
+            </a:r>
+            <a:r>
+              <a:rPr lang="ru-RU" dirty="0" smtClean="0"/>
+              <a:t>шифрования</a:t>
+            </a:r>
+          </a:p>
+          <a:p>
+            <a:r>
+              <a:rPr lang="ru-RU" dirty="0" smtClean="0"/>
+              <a:t>Никогда не реализовывать криптографию!</a:t>
+            </a:r>
+            <a:endParaRPr lang="ru-RU" dirty="0"/>
+          </a:p>
+        </p:txBody>
+      </p:sp>
+      <p:sp>
+        <p:nvSpPr>
+          <p:cNvPr id="4" name="Номер слайда 3"/>
+          <p:cNvSpPr>
+            <a:spLocks noGrp="1"/>
+          </p:cNvSpPr>
+          <p:nvPr>
+            <p:ph type="sldNum" sz="quarter" idx="12"/>
+          </p:nvPr>
+        </p:nvSpPr>
+        <p:spPr/>
+        <p:txBody>
+          <a:bodyPr/>
+          <a:lstStyle/>
+          <a:p>
+            <a:fld id="{8253DDDB-F8F7-4D64-A7FD-3F3D61C1949F}" type="slidenum">
+              <a:rPr lang="ru-RU" smtClean="0"/>
+              <a:t>41</a:t>
             </a:fld>
             <a:endParaRPr lang="ru-RU"/>
           </a:p>

</xml_diff>